<commit_message>
Pushing updated slide deck for lec-32
</commit_message>
<xml_diff>
--- a/tyler/meena/cs220/s21/materials/lec_32_S21.pptx
+++ b/tyler/meena/cs220/s21/materials/lec_32_S21.pptx
@@ -31,12 +31,12 @@
     <p:sldId id="276" r:id="rId22"/>
     <p:sldId id="277" r:id="rId23"/>
     <p:sldId id="278" r:id="rId24"/>
-    <p:sldId id="279" r:id="rId25"/>
-    <p:sldId id="283" r:id="rId26"/>
-    <p:sldId id="284" r:id="rId27"/>
-    <p:sldId id="285" r:id="rId28"/>
-    <p:sldId id="286" r:id="rId29"/>
-    <p:sldId id="287" r:id="rId30"/>
+    <p:sldId id="283" r:id="rId25"/>
+    <p:sldId id="284" r:id="rId26"/>
+    <p:sldId id="285" r:id="rId27"/>
+    <p:sldId id="286" r:id="rId28"/>
+    <p:sldId id="287" r:id="rId29"/>
+    <p:sldId id="279" r:id="rId30"/>
     <p:sldId id="282" r:id="rId31"/>
     <p:sldId id="280" r:id="rId32"/>
     <p:sldId id="281" r:id="rId33"/>
@@ -10499,7 +10499,7 @@
       </p:grpSpPr>
       <p:sp>
         <p:nvSpPr>
-          <p:cNvPr id="333" name="Vertical Space"/>
+          <p:cNvPr id="364" name="Vertical Space"/>
           <p:cNvSpPr txBox="1">
             <a:spLocks noGrp="1"/>
           </p:cNvSpPr>
@@ -10525,6 +10525,7 @@
           </a:lstStyle>
           <a:p>
             <a:r>
+              <a:rPr dirty="0"/>
               <a:t>Vertical Space</a:t>
             </a:r>
           </a:p>
@@ -10532,7 +10533,7 @@
       </p:sp>
       <p:sp>
         <p:nvSpPr>
-          <p:cNvPr id="334" name="Notebook"/>
+          <p:cNvPr id="365" name="Notebook"/>
           <p:cNvSpPr/>
           <p:nvPr/>
         </p:nvSpPr>
@@ -10673,14 +10674,14 @@
       </p:sp>
       <p:sp>
         <p:nvSpPr>
-          <p:cNvPr id="335" name="Welcome…"/>
+          <p:cNvPr id="366" name="This is a test page.…"/>
           <p:cNvSpPr txBox="1"/>
           <p:nvPr/>
         </p:nvSpPr>
         <p:spPr>
           <a:xfrm>
             <a:off x="3987800" y="5834278"/>
-            <a:ext cx="5137830" cy="2463801"/>
+            <a:ext cx="5137830" cy="1320801"/>
           </a:xfrm>
           <a:prstGeom prst="rect">
             <a:avLst/>
@@ -10701,10 +10702,10 @@
           <a:lstStyle/>
           <a:p>
             <a:pPr algn="l">
-              <a:defRPr sz="5000"/>
-            </a:pPr>
-            <a:r>
-              <a:t>Welcome</a:t>
+              <a:defRPr sz="2800" b="0"/>
+            </a:pPr>
+            <a:r>
+              <a:t>This is a test page.</a:t>
             </a:r>
           </a:p>
           <a:p>
@@ -10718,20 +10719,6 @@
               <a:defRPr sz="2800" b="0"/>
             </a:pPr>
             <a:r>
-              <a:t>This is a test page.</a:t>
-            </a:r>
-          </a:p>
-          <a:p>
-            <a:pPr algn="l">
-              <a:defRPr sz="2800" b="0"/>
-            </a:pPr>
-            <a:endParaRPr/>
-          </a:p>
-          <a:p>
-            <a:pPr algn="l">
-              <a:defRPr sz="2800" b="0"/>
-            </a:pPr>
-            <a:r>
               <a:t>It is awesome.</a:t>
             </a:r>
           </a:p>
@@ -10739,7 +10726,7 @@
       </p:sp>
       <p:sp>
         <p:nvSpPr>
-          <p:cNvPr id="336" name="&lt;h1&gt;Welcome&lt;/h1&gt;…"/>
+          <p:cNvPr id="367" name="This is a test page.…"/>
           <p:cNvSpPr/>
           <p:nvPr/>
         </p:nvSpPr>
@@ -10769,6 +10756,14 @@
         <p:txBody>
           <a:bodyPr lIns="50800" tIns="50800" rIns="50800" bIns="50800"/>
           <a:lstStyle/>
+          <a:p>
+            <a:pPr algn="l">
+              <a:defRPr sz="2600"/>
+            </a:pPr>
+            <a:r>
+              <a:t>This is a test page.</a:t>
+            </a:r>
+          </a:p>
           <a:p>
             <a:pPr algn="l">
               <a:defRPr sz="2600"/>
@@ -10783,65 +10778,22 @@
                   </a:schemeClr>
                 </a:solidFill>
               </a:rPr>
-              <a:t>&lt;h1&gt;</a:t>
-            </a:r>
-            <a:r>
-              <a:t>Welcome</a:t>
-            </a:r>
-            <a:r>
-              <a:rPr>
-                <a:solidFill>
-                  <a:schemeClr val="accent5">
-                    <a:hueOff val="-82419"/>
-                    <a:satOff val="-9513"/>
-                    <a:lumOff val="-16343"/>
-                  </a:schemeClr>
-                </a:solidFill>
-              </a:rPr>
-              <a:t>&lt;/h1&gt;</a:t>
+              <a:t>&lt;br&gt;&lt;br&gt;</a:t>
             </a:r>
           </a:p>
           <a:p>
             <a:pPr algn="l">
               <a:defRPr sz="2600"/>
             </a:pPr>
-            <a:endParaRPr>
-              <a:solidFill>
-                <a:schemeClr val="accent5">
-                  <a:hueOff val="-82419"/>
-                  <a:satOff val="-9513"/>
-                  <a:lumOff val="-16343"/>
-                </a:schemeClr>
-              </a:solidFill>
-            </a:endParaRPr>
-          </a:p>
-          <a:p>
-            <a:pPr algn="l">
-              <a:defRPr sz="2600"/>
-            </a:pPr>
-            <a:r>
-              <a:t>&lt;p&gt;This is a test page.&lt;/p&gt;</a:t>
-            </a:r>
-          </a:p>
-          <a:p>
-            <a:pPr algn="l">
-              <a:defRPr sz="2600"/>
-            </a:pPr>
-            <a:endParaRPr/>
-          </a:p>
-          <a:p>
-            <a:pPr algn="l">
-              <a:defRPr sz="2600"/>
-            </a:pPr>
-            <a:r>
-              <a:t>&lt;p&gt;It is awesome.&lt;/p&gt;</a:t>
-            </a:r>
-          </a:p>
-        </p:txBody>
-      </p:sp>
-      <p:sp>
-        <p:nvSpPr>
-          <p:cNvPr id="337" name="test.html"/>
+            <a:r>
+              <a:t>It is awesome.</a:t>
+            </a:r>
+          </a:p>
+        </p:txBody>
+      </p:sp>
+      <p:sp>
+        <p:nvSpPr>
+          <p:cNvPr id="368" name="test.html"/>
           <p:cNvSpPr txBox="1"/>
           <p:nvPr/>
         </p:nvSpPr>
@@ -10878,14 +10830,14 @@
       </p:sp>
       <p:sp>
         <p:nvSpPr>
-          <p:cNvPr id="338" name="h1: big header"/>
+          <p:cNvPr id="369" name="br: line break"/>
           <p:cNvSpPr txBox="1"/>
           <p:nvPr/>
         </p:nvSpPr>
         <p:spPr>
           <a:xfrm>
-            <a:off x="1019472" y="2349499"/>
-            <a:ext cx="2964856" cy="685801"/>
+            <a:off x="1101328" y="2349499"/>
+            <a:ext cx="2801144" cy="685801"/>
           </a:xfrm>
           <a:prstGeom prst="rect">
             <a:avLst/>
@@ -10910,7 +10862,7 @@
           </a:lstStyle>
           <a:p>
             <a:r>
-              <a:t>h1: big header</a:t>
+              <a:t>br: line break</a:t>
             </a:r>
           </a:p>
         </p:txBody>
@@ -10943,7 +10895,7 @@
       </p:grpSpPr>
       <p:sp>
         <p:nvSpPr>
-          <p:cNvPr id="364" name="Vertical Space"/>
+          <p:cNvPr id="371" name="Vertical Space"/>
           <p:cNvSpPr txBox="1">
             <a:spLocks noGrp="1"/>
           </p:cNvSpPr>
@@ -10969,7 +10921,6 @@
           </a:lstStyle>
           <a:p>
             <a:r>
-              <a:rPr dirty="0"/>
               <a:t>Vertical Space</a:t>
             </a:r>
           </a:p>
@@ -10977,7 +10928,7 @@
       </p:sp>
       <p:sp>
         <p:nvSpPr>
-          <p:cNvPr id="365" name="Notebook"/>
+          <p:cNvPr id="372" name="Notebook"/>
           <p:cNvSpPr/>
           <p:nvPr/>
         </p:nvSpPr>
@@ -11118,14 +11069,14 @@
       </p:sp>
       <p:sp>
         <p:nvSpPr>
-          <p:cNvPr id="366" name="This is a test page.…"/>
+          <p:cNvPr id="373" name="This is a test page.…"/>
           <p:cNvSpPr txBox="1"/>
           <p:nvPr/>
         </p:nvSpPr>
         <p:spPr>
           <a:xfrm>
             <a:off x="3987800" y="5834278"/>
-            <a:ext cx="5137830" cy="1320801"/>
+            <a:ext cx="5137830" cy="1727201"/>
           </a:xfrm>
           <a:prstGeom prst="rect">
             <a:avLst/>
@@ -11162,6 +11113,12 @@
             <a:pPr algn="l">
               <a:defRPr sz="2800" b="0"/>
             </a:pPr>
+            <a:endParaRPr/>
+          </a:p>
+          <a:p>
+            <a:pPr algn="l">
+              <a:defRPr sz="2800" b="0"/>
+            </a:pPr>
             <a:r>
               <a:t>It is awesome.</a:t>
             </a:r>
@@ -11170,7 +11127,7 @@
       </p:sp>
       <p:sp>
         <p:nvSpPr>
-          <p:cNvPr id="367" name="This is a test page.…"/>
+          <p:cNvPr id="374" name="This is a test page.…"/>
           <p:cNvSpPr/>
           <p:nvPr/>
         </p:nvSpPr>
@@ -11222,7 +11179,7 @@
                   </a:schemeClr>
                 </a:solidFill>
               </a:rPr>
-              <a:t>&lt;br&gt;&lt;br&gt;</a:t>
+              <a:t>&lt;br&gt;&lt;br&gt;&lt;br&gt;</a:t>
             </a:r>
           </a:p>
           <a:p>
@@ -11237,7 +11194,7 @@
       </p:sp>
       <p:sp>
         <p:nvSpPr>
-          <p:cNvPr id="368" name="test.html"/>
+          <p:cNvPr id="375" name="test.html"/>
           <p:cNvSpPr txBox="1"/>
           <p:nvPr/>
         </p:nvSpPr>
@@ -11274,7 +11231,7 @@
       </p:sp>
       <p:sp>
         <p:nvSpPr>
-          <p:cNvPr id="369" name="br: line break"/>
+          <p:cNvPr id="376" name="br: line break"/>
           <p:cNvSpPr txBox="1"/>
           <p:nvPr/>
         </p:nvSpPr>
@@ -11339,7 +11296,7 @@
       </p:grpSpPr>
       <p:sp>
         <p:nvSpPr>
-          <p:cNvPr id="371" name="Vertical Space"/>
+          <p:cNvPr id="378" name="Vertical Space"/>
           <p:cNvSpPr txBox="1">
             <a:spLocks noGrp="1"/>
           </p:cNvSpPr>
@@ -11372,7 +11329,7 @@
       </p:sp>
       <p:sp>
         <p:nvSpPr>
-          <p:cNvPr id="372" name="Notebook"/>
+          <p:cNvPr id="379" name="Notebook"/>
           <p:cNvSpPr/>
           <p:nvPr/>
         </p:nvSpPr>
@@ -11513,14 +11470,14 @@
       </p:sp>
       <p:sp>
         <p:nvSpPr>
-          <p:cNvPr id="373" name="This is a test page.…"/>
+          <p:cNvPr id="380" name="This is a test page.…"/>
           <p:cNvSpPr txBox="1"/>
           <p:nvPr/>
         </p:nvSpPr>
         <p:spPr>
           <a:xfrm>
             <a:off x="3987800" y="5834278"/>
-            <a:ext cx="5137830" cy="1727201"/>
+            <a:ext cx="5137830" cy="2133601"/>
           </a:xfrm>
           <a:prstGeom prst="rect">
             <a:avLst/>
@@ -11563,6 +11520,12 @@
             <a:pPr algn="l">
               <a:defRPr sz="2800" b="0"/>
             </a:pPr>
+            <a:endParaRPr/>
+          </a:p>
+          <a:p>
+            <a:pPr algn="l">
+              <a:defRPr sz="2800" b="0"/>
+            </a:pPr>
             <a:r>
               <a:t>It is awesome.</a:t>
             </a:r>
@@ -11571,7 +11534,7 @@
       </p:sp>
       <p:sp>
         <p:nvSpPr>
-          <p:cNvPr id="374" name="This is a test page.…"/>
+          <p:cNvPr id="381" name="This is a test page.…"/>
           <p:cNvSpPr/>
           <p:nvPr/>
         </p:nvSpPr>
@@ -11623,7 +11586,7 @@
                   </a:schemeClr>
                 </a:solidFill>
               </a:rPr>
-              <a:t>&lt;br&gt;&lt;br&gt;&lt;br&gt;</a:t>
+              <a:t>&lt;br&gt;&lt;br&gt;&lt;br&gt;&lt;br&gt;</a:t>
             </a:r>
           </a:p>
           <a:p>
@@ -11638,7 +11601,7 @@
       </p:sp>
       <p:sp>
         <p:nvSpPr>
-          <p:cNvPr id="375" name="test.html"/>
+          <p:cNvPr id="382" name="test.html"/>
           <p:cNvSpPr txBox="1"/>
           <p:nvPr/>
         </p:nvSpPr>
@@ -11675,7 +11638,7 @@
       </p:sp>
       <p:sp>
         <p:nvSpPr>
-          <p:cNvPr id="376" name="br: line break"/>
+          <p:cNvPr id="383" name="br: line break"/>
           <p:cNvSpPr txBox="1"/>
           <p:nvPr/>
         </p:nvSpPr>
@@ -11722,413 +11685,6 @@
 </file>
 
 <file path=ppt/slides/slide27.xml><?xml version="1.0" encoding="utf-8"?>
-<p:sld xmlns:a="http://schemas.openxmlformats.org/drawingml/2006/main" xmlns:r="http://schemas.openxmlformats.org/officeDocument/2006/relationships" xmlns:p="http://schemas.openxmlformats.org/presentationml/2006/main">
-  <p:cSld>
-    <p:spTree>
-      <p:nvGrpSpPr>
-        <p:cNvPr id="1" name=""/>
-        <p:cNvGrpSpPr/>
-        <p:nvPr/>
-      </p:nvGrpSpPr>
-      <p:grpSpPr>
-        <a:xfrm>
-          <a:off x="0" y="0"/>
-          <a:ext cx="0" cy="0"/>
-          <a:chOff x="0" y="0"/>
-          <a:chExt cx="0" cy="0"/>
-        </a:xfrm>
-      </p:grpSpPr>
-      <p:sp>
-        <p:nvSpPr>
-          <p:cNvPr id="378" name="Vertical Space"/>
-          <p:cNvSpPr txBox="1">
-            <a:spLocks noGrp="1"/>
-          </p:cNvSpPr>
-          <p:nvPr>
-            <p:ph type="title"/>
-          </p:nvPr>
-        </p:nvSpPr>
-        <p:spPr>
-          <a:xfrm>
-            <a:off x="952500" y="254000"/>
-            <a:ext cx="11099800" cy="902345"/>
-          </a:xfrm>
-          <a:prstGeom prst="rect">
-            <a:avLst/>
-          </a:prstGeom>
-        </p:spPr>
-        <p:txBody>
-          <a:bodyPr/>
-          <a:lstStyle>
-            <a:lvl1pPr algn="l">
-              <a:defRPr sz="4800"/>
-            </a:lvl1pPr>
-          </a:lstStyle>
-          <a:p>
-            <a:r>
-              <a:t>Vertical Space</a:t>
-            </a:r>
-          </a:p>
-        </p:txBody>
-      </p:sp>
-      <p:sp>
-        <p:nvSpPr>
-          <p:cNvPr id="379" name="Notebook"/>
-          <p:cNvSpPr/>
-          <p:nvPr/>
-        </p:nvSpPr>
-        <p:spPr>
-          <a:xfrm>
-            <a:off x="2910067" y="5311211"/>
-            <a:ext cx="7184666" cy="4024588"/>
-          </a:xfrm>
-          <a:custGeom>
-            <a:avLst/>
-            <a:gdLst/>
-            <a:ahLst/>
-            <a:cxnLst>
-              <a:cxn ang="0">
-                <a:pos x="wd2" y="hd2"/>
-              </a:cxn>
-              <a:cxn ang="5400000">
-                <a:pos x="wd2" y="hd2"/>
-              </a:cxn>
-              <a:cxn ang="10800000">
-                <a:pos x="wd2" y="hd2"/>
-              </a:cxn>
-              <a:cxn ang="16200000">
-                <a:pos x="wd2" y="hd2"/>
-              </a:cxn>
-            </a:cxnLst>
-            <a:rect l="0" t="0" r="r" b="b"/>
-            <a:pathLst>
-              <a:path w="21600" h="21599" extrusionOk="0">
-                <a:moveTo>
-                  <a:pt x="1952" y="0"/>
-                </a:moveTo>
-                <a:cubicBezTo>
-                  <a:pt x="1421" y="0"/>
-                  <a:pt x="1439" y="771"/>
-                  <a:pt x="1439" y="1718"/>
-                </a:cubicBezTo>
-                <a:lnTo>
-                  <a:pt x="1439" y="19328"/>
-                </a:lnTo>
-                <a:lnTo>
-                  <a:pt x="0" y="19328"/>
-                </a:lnTo>
-                <a:cubicBezTo>
-                  <a:pt x="0" y="19328"/>
-                  <a:pt x="0" y="19890"/>
-                  <a:pt x="0" y="20529"/>
-                </a:cubicBezTo>
-                <a:cubicBezTo>
-                  <a:pt x="0" y="21600"/>
-                  <a:pt x="190" y="21599"/>
-                  <a:pt x="896" y="21599"/>
-                </a:cubicBezTo>
-                <a:lnTo>
-                  <a:pt x="10332" y="21599"/>
-                </a:lnTo>
-                <a:lnTo>
-                  <a:pt x="11268" y="21599"/>
-                </a:lnTo>
-                <a:lnTo>
-                  <a:pt x="20704" y="21599"/>
-                </a:lnTo>
-                <a:cubicBezTo>
-                  <a:pt x="21367" y="21599"/>
-                  <a:pt x="21600" y="21600"/>
-                  <a:pt x="21600" y="20529"/>
-                </a:cubicBezTo>
-                <a:cubicBezTo>
-                  <a:pt x="21600" y="19890"/>
-                  <a:pt x="21600" y="19328"/>
-                  <a:pt x="21600" y="19328"/>
-                </a:cubicBezTo>
-                <a:lnTo>
-                  <a:pt x="20161" y="19328"/>
-                </a:lnTo>
-                <a:lnTo>
-                  <a:pt x="20161" y="1718"/>
-                </a:lnTo>
-                <a:cubicBezTo>
-                  <a:pt x="20161" y="771"/>
-                  <a:pt x="20196" y="0"/>
-                  <a:pt x="19665" y="0"/>
-                </a:cubicBezTo>
-                <a:lnTo>
-                  <a:pt x="1952" y="0"/>
-                </a:lnTo>
-                <a:close/>
-                <a:moveTo>
-                  <a:pt x="2475" y="1849"/>
-                </a:moveTo>
-                <a:lnTo>
-                  <a:pt x="19125" y="1849"/>
-                </a:lnTo>
-                <a:lnTo>
-                  <a:pt x="19125" y="19328"/>
-                </a:lnTo>
-                <a:lnTo>
-                  <a:pt x="11268" y="19328"/>
-                </a:lnTo>
-                <a:lnTo>
-                  <a:pt x="10332" y="19328"/>
-                </a:lnTo>
-                <a:lnTo>
-                  <a:pt x="2475" y="19328"/>
-                </a:lnTo>
-                <a:lnTo>
-                  <a:pt x="2475" y="1849"/>
-                </a:lnTo>
-                <a:close/>
-              </a:path>
-            </a:pathLst>
-          </a:custGeom>
-          <a:solidFill>
-            <a:schemeClr val="accent1"/>
-          </a:solidFill>
-          <a:ln w="12700">
-            <a:miter lim="400000"/>
-          </a:ln>
-        </p:spPr>
-        <p:txBody>
-          <a:bodyPr lIns="50800" tIns="50800" rIns="50800" bIns="50800" anchor="ctr"/>
-          <a:lstStyle/>
-          <a:p>
-            <a:pPr>
-              <a:defRPr sz="2200" b="0">
-                <a:solidFill>
-                  <a:srgbClr val="FFFFFF"/>
-                </a:solidFill>
-                <a:latin typeface="+mn-lt"/>
-                <a:ea typeface="+mn-ea"/>
-                <a:cs typeface="+mn-cs"/>
-                <a:sym typeface="Gill Sans SemiBold"/>
-              </a:defRPr>
-            </a:pPr>
-            <a:endParaRPr/>
-          </a:p>
-        </p:txBody>
-      </p:sp>
-      <p:sp>
-        <p:nvSpPr>
-          <p:cNvPr id="380" name="This is a test page.…"/>
-          <p:cNvSpPr txBox="1"/>
-          <p:nvPr/>
-        </p:nvSpPr>
-        <p:spPr>
-          <a:xfrm>
-            <a:off x="3987800" y="5834278"/>
-            <a:ext cx="5137830" cy="2133601"/>
-          </a:xfrm>
-          <a:prstGeom prst="rect">
-            <a:avLst/>
-          </a:prstGeom>
-          <a:ln w="12700">
-            <a:miter lim="400000"/>
-          </a:ln>
-          <a:extLst>
-            <a:ext uri="{C572A759-6A51-4108-AA02-DFA0A04FC94B}">
-              <ma14:wrappingTextBoxFlag xmlns="" xmlns:m="http://schemas.openxmlformats.org/officeDocument/2006/math" xmlns:a14="http://schemas.microsoft.com/office/drawing/2010/main" xmlns:ma14="http://schemas.microsoft.com/office/mac/drawingml/2011/main" val="1"/>
-            </a:ext>
-          </a:extLst>
-        </p:spPr>
-        <p:txBody>
-          <a:bodyPr lIns="50800" tIns="50800" rIns="50800" bIns="50800">
-            <a:spAutoFit/>
-          </a:bodyPr>
-          <a:lstStyle/>
-          <a:p>
-            <a:pPr algn="l">
-              <a:defRPr sz="2800" b="0"/>
-            </a:pPr>
-            <a:r>
-              <a:t>This is a test page.</a:t>
-            </a:r>
-          </a:p>
-          <a:p>
-            <a:pPr algn="l">
-              <a:defRPr sz="2800" b="0"/>
-            </a:pPr>
-            <a:endParaRPr/>
-          </a:p>
-          <a:p>
-            <a:pPr algn="l">
-              <a:defRPr sz="2800" b="0"/>
-            </a:pPr>
-            <a:endParaRPr/>
-          </a:p>
-          <a:p>
-            <a:pPr algn="l">
-              <a:defRPr sz="2800" b="0"/>
-            </a:pPr>
-            <a:endParaRPr/>
-          </a:p>
-          <a:p>
-            <a:pPr algn="l">
-              <a:defRPr sz="2800" b="0"/>
-            </a:pPr>
-            <a:r>
-              <a:t>It is awesome.</a:t>
-            </a:r>
-          </a:p>
-        </p:txBody>
-      </p:sp>
-      <p:sp>
-        <p:nvSpPr>
-          <p:cNvPr id="381" name="This is a test page.…"/>
-          <p:cNvSpPr/>
-          <p:nvPr/>
-        </p:nvSpPr>
-        <p:spPr>
-          <a:xfrm>
-            <a:off x="6362700" y="2008443"/>
-            <a:ext cx="5736680" cy="2272870"/>
-          </a:xfrm>
-          <a:prstGeom prst="rect">
-            <a:avLst/>
-          </a:prstGeom>
-          <a:solidFill>
-            <a:srgbClr val="FFFFFF"/>
-          </a:solidFill>
-          <a:ln w="25400">
-            <a:solidFill>
-              <a:srgbClr val="000000"/>
-            </a:solidFill>
-            <a:miter lim="400000"/>
-          </a:ln>
-          <a:extLst>
-            <a:ext uri="{C572A759-6A51-4108-AA02-DFA0A04FC94B}">
-              <ma14:wrappingTextBoxFlag xmlns="" xmlns:m="http://schemas.openxmlformats.org/officeDocument/2006/math" xmlns:a14="http://schemas.microsoft.com/office/drawing/2010/main" xmlns:ma14="http://schemas.microsoft.com/office/mac/drawingml/2011/main" val="1"/>
-            </a:ext>
-          </a:extLst>
-        </p:spPr>
-        <p:txBody>
-          <a:bodyPr lIns="50800" tIns="50800" rIns="50800" bIns="50800"/>
-          <a:lstStyle/>
-          <a:p>
-            <a:pPr algn="l">
-              <a:defRPr sz="2600"/>
-            </a:pPr>
-            <a:r>
-              <a:t>This is a test page.</a:t>
-            </a:r>
-          </a:p>
-          <a:p>
-            <a:pPr algn="l">
-              <a:defRPr sz="2600"/>
-            </a:pPr>
-            <a:r>
-              <a:rPr>
-                <a:solidFill>
-                  <a:schemeClr val="accent5">
-                    <a:hueOff val="-82419"/>
-                    <a:satOff val="-9513"/>
-                    <a:lumOff val="-16343"/>
-                  </a:schemeClr>
-                </a:solidFill>
-              </a:rPr>
-              <a:t>&lt;br&gt;&lt;br&gt;&lt;br&gt;&lt;br&gt;</a:t>
-            </a:r>
-          </a:p>
-          <a:p>
-            <a:pPr algn="l">
-              <a:defRPr sz="2600"/>
-            </a:pPr>
-            <a:r>
-              <a:t>It is awesome.</a:t>
-            </a:r>
-          </a:p>
-        </p:txBody>
-      </p:sp>
-      <p:sp>
-        <p:nvSpPr>
-          <p:cNvPr id="382" name="test.html"/>
-          <p:cNvSpPr txBox="1"/>
-          <p:nvPr/>
-        </p:nvSpPr>
-        <p:spPr>
-          <a:xfrm>
-            <a:off x="6391527" y="1487743"/>
-            <a:ext cx="1547218" cy="457201"/>
-          </a:xfrm>
-          <a:prstGeom prst="rect">
-            <a:avLst/>
-          </a:prstGeom>
-          <a:ln w="12700">
-            <a:miter lim="400000"/>
-          </a:ln>
-          <a:extLst>
-            <a:ext uri="{C572A759-6A51-4108-AA02-DFA0A04FC94B}">
-              <ma14:wrappingTextBoxFlag xmlns="" xmlns:m="http://schemas.openxmlformats.org/officeDocument/2006/math" xmlns:a14="http://schemas.microsoft.com/office/drawing/2010/main" xmlns:ma14="http://schemas.microsoft.com/office/mac/drawingml/2011/main" val="1"/>
-            </a:ext>
-          </a:extLst>
-        </p:spPr>
-        <p:txBody>
-          <a:bodyPr wrap="none" lIns="50800" tIns="50800" rIns="50800" bIns="50800" anchor="ctr">
-            <a:spAutoFit/>
-          </a:bodyPr>
-          <a:lstStyle>
-            <a:lvl1pPr algn="l"/>
-          </a:lstStyle>
-          <a:p>
-            <a:r>
-              <a:t>test.html</a:t>
-            </a:r>
-          </a:p>
-        </p:txBody>
-      </p:sp>
-      <p:sp>
-        <p:nvSpPr>
-          <p:cNvPr id="383" name="br: line break"/>
-          <p:cNvSpPr txBox="1"/>
-          <p:nvPr/>
-        </p:nvSpPr>
-        <p:spPr>
-          <a:xfrm>
-            <a:off x="1101328" y="2349499"/>
-            <a:ext cx="2801144" cy="685801"/>
-          </a:xfrm>
-          <a:prstGeom prst="rect">
-            <a:avLst/>
-          </a:prstGeom>
-          <a:ln w="12700">
-            <a:miter lim="400000"/>
-          </a:ln>
-          <a:extLst>
-            <a:ext uri="{C572A759-6A51-4108-AA02-DFA0A04FC94B}">
-              <ma14:wrappingTextBoxFlag xmlns="" xmlns:m="http://schemas.openxmlformats.org/officeDocument/2006/math" xmlns:a14="http://schemas.microsoft.com/office/drawing/2010/main" xmlns:ma14="http://schemas.microsoft.com/office/mac/drawingml/2011/main" val="1"/>
-            </a:ext>
-          </a:extLst>
-        </p:spPr>
-        <p:txBody>
-          <a:bodyPr wrap="none" lIns="50800" tIns="50800" rIns="50800" bIns="50800" anchor="ctr">
-            <a:spAutoFit/>
-          </a:bodyPr>
-          <a:lstStyle>
-            <a:lvl1pPr>
-              <a:defRPr sz="4000" b="0"/>
-            </a:lvl1pPr>
-          </a:lstStyle>
-          <a:p>
-            <a:r>
-              <a:t>br: line break</a:t>
-            </a:r>
-          </a:p>
-        </p:txBody>
-      </p:sp>
-    </p:spTree>
-  </p:cSld>
-  <p:clrMapOvr>
-    <a:masterClrMapping/>
-  </p:clrMapOvr>
-  <p:transition spd="med"/>
-</p:sld>
-</file>
-
-<file path=ppt/slides/slide28.xml><?xml version="1.0" encoding="utf-8"?>
 <p:sld xmlns:a="http://schemas.openxmlformats.org/drawingml/2006/main" xmlns:r="http://schemas.openxmlformats.org/officeDocument/2006/relationships" xmlns:p="http://schemas.openxmlformats.org/presentationml/2006/main">
   <p:cSld>
     <p:spTree>
@@ -12660,7 +12216,7 @@
 </p:sld>
 </file>
 
-<file path=ppt/slides/slide29.xml><?xml version="1.0" encoding="utf-8"?>
+<file path=ppt/slides/slide28.xml><?xml version="1.0" encoding="utf-8"?>
 <p:sld xmlns:a="http://schemas.openxmlformats.org/drawingml/2006/main" xmlns:r="http://schemas.openxmlformats.org/officeDocument/2006/relationships" xmlns:p="http://schemas.openxmlformats.org/presentationml/2006/main">
   <p:cSld>
     <p:spTree>
@@ -13164,6 +12720,452 @@
           <a:p>
             <a:r>
               <a:t>sometimes you’ll encounter it like this</a:t>
+            </a:r>
+          </a:p>
+        </p:txBody>
+      </p:sp>
+    </p:spTree>
+  </p:cSld>
+  <p:clrMapOvr>
+    <a:masterClrMapping/>
+  </p:clrMapOvr>
+  <p:transition spd="med"/>
+</p:sld>
+</file>
+
+<file path=ppt/slides/slide29.xml><?xml version="1.0" encoding="utf-8"?>
+<p:sld xmlns:a="http://schemas.openxmlformats.org/drawingml/2006/main" xmlns:r="http://schemas.openxmlformats.org/officeDocument/2006/relationships" xmlns:p="http://schemas.openxmlformats.org/presentationml/2006/main">
+  <p:cSld>
+    <p:spTree>
+      <p:nvGrpSpPr>
+        <p:cNvPr id="1" name=""/>
+        <p:cNvGrpSpPr/>
+        <p:nvPr/>
+      </p:nvGrpSpPr>
+      <p:grpSpPr>
+        <a:xfrm>
+          <a:off x="0" y="0"/>
+          <a:ext cx="0" cy="0"/>
+          <a:chOff x="0" y="0"/>
+          <a:chExt cx="0" cy="0"/>
+        </a:xfrm>
+      </p:grpSpPr>
+      <p:sp>
+        <p:nvSpPr>
+          <p:cNvPr id="333" name="Vertical Space"/>
+          <p:cNvSpPr txBox="1">
+            <a:spLocks noGrp="1"/>
+          </p:cNvSpPr>
+          <p:nvPr>
+            <p:ph type="title"/>
+          </p:nvPr>
+        </p:nvSpPr>
+        <p:spPr>
+          <a:xfrm>
+            <a:off x="952500" y="254000"/>
+            <a:ext cx="11099800" cy="902345"/>
+          </a:xfrm>
+          <a:prstGeom prst="rect">
+            <a:avLst/>
+          </a:prstGeom>
+        </p:spPr>
+        <p:txBody>
+          <a:bodyPr/>
+          <a:lstStyle>
+            <a:lvl1pPr algn="l">
+              <a:defRPr sz="4800"/>
+            </a:lvl1pPr>
+          </a:lstStyle>
+          <a:p>
+            <a:r>
+              <a:rPr lang="en-US"/>
+              <a:t>Headers</a:t>
+            </a:r>
+            <a:endParaRPr dirty="0"/>
+          </a:p>
+        </p:txBody>
+      </p:sp>
+      <p:sp>
+        <p:nvSpPr>
+          <p:cNvPr id="334" name="Notebook"/>
+          <p:cNvSpPr/>
+          <p:nvPr/>
+        </p:nvSpPr>
+        <p:spPr>
+          <a:xfrm>
+            <a:off x="2910067" y="5311211"/>
+            <a:ext cx="7184666" cy="4024588"/>
+          </a:xfrm>
+          <a:custGeom>
+            <a:avLst/>
+            <a:gdLst/>
+            <a:ahLst/>
+            <a:cxnLst>
+              <a:cxn ang="0">
+                <a:pos x="wd2" y="hd2"/>
+              </a:cxn>
+              <a:cxn ang="5400000">
+                <a:pos x="wd2" y="hd2"/>
+              </a:cxn>
+              <a:cxn ang="10800000">
+                <a:pos x="wd2" y="hd2"/>
+              </a:cxn>
+              <a:cxn ang="16200000">
+                <a:pos x="wd2" y="hd2"/>
+              </a:cxn>
+            </a:cxnLst>
+            <a:rect l="0" t="0" r="r" b="b"/>
+            <a:pathLst>
+              <a:path w="21600" h="21599" extrusionOk="0">
+                <a:moveTo>
+                  <a:pt x="1952" y="0"/>
+                </a:moveTo>
+                <a:cubicBezTo>
+                  <a:pt x="1421" y="0"/>
+                  <a:pt x="1439" y="771"/>
+                  <a:pt x="1439" y="1718"/>
+                </a:cubicBezTo>
+                <a:lnTo>
+                  <a:pt x="1439" y="19328"/>
+                </a:lnTo>
+                <a:lnTo>
+                  <a:pt x="0" y="19328"/>
+                </a:lnTo>
+                <a:cubicBezTo>
+                  <a:pt x="0" y="19328"/>
+                  <a:pt x="0" y="19890"/>
+                  <a:pt x="0" y="20529"/>
+                </a:cubicBezTo>
+                <a:cubicBezTo>
+                  <a:pt x="0" y="21600"/>
+                  <a:pt x="190" y="21599"/>
+                  <a:pt x="896" y="21599"/>
+                </a:cubicBezTo>
+                <a:lnTo>
+                  <a:pt x="10332" y="21599"/>
+                </a:lnTo>
+                <a:lnTo>
+                  <a:pt x="11268" y="21599"/>
+                </a:lnTo>
+                <a:lnTo>
+                  <a:pt x="20704" y="21599"/>
+                </a:lnTo>
+                <a:cubicBezTo>
+                  <a:pt x="21367" y="21599"/>
+                  <a:pt x="21600" y="21600"/>
+                  <a:pt x="21600" y="20529"/>
+                </a:cubicBezTo>
+                <a:cubicBezTo>
+                  <a:pt x="21600" y="19890"/>
+                  <a:pt x="21600" y="19328"/>
+                  <a:pt x="21600" y="19328"/>
+                </a:cubicBezTo>
+                <a:lnTo>
+                  <a:pt x="20161" y="19328"/>
+                </a:lnTo>
+                <a:lnTo>
+                  <a:pt x="20161" y="1718"/>
+                </a:lnTo>
+                <a:cubicBezTo>
+                  <a:pt x="20161" y="771"/>
+                  <a:pt x="20196" y="0"/>
+                  <a:pt x="19665" y="0"/>
+                </a:cubicBezTo>
+                <a:lnTo>
+                  <a:pt x="1952" y="0"/>
+                </a:lnTo>
+                <a:close/>
+                <a:moveTo>
+                  <a:pt x="2475" y="1849"/>
+                </a:moveTo>
+                <a:lnTo>
+                  <a:pt x="19125" y="1849"/>
+                </a:lnTo>
+                <a:lnTo>
+                  <a:pt x="19125" y="19328"/>
+                </a:lnTo>
+                <a:lnTo>
+                  <a:pt x="11268" y="19328"/>
+                </a:lnTo>
+                <a:lnTo>
+                  <a:pt x="10332" y="19328"/>
+                </a:lnTo>
+                <a:lnTo>
+                  <a:pt x="2475" y="19328"/>
+                </a:lnTo>
+                <a:lnTo>
+                  <a:pt x="2475" y="1849"/>
+                </a:lnTo>
+                <a:close/>
+              </a:path>
+            </a:pathLst>
+          </a:custGeom>
+          <a:solidFill>
+            <a:schemeClr val="accent1"/>
+          </a:solidFill>
+          <a:ln w="12700">
+            <a:miter lim="400000"/>
+          </a:ln>
+        </p:spPr>
+        <p:txBody>
+          <a:bodyPr lIns="50800" tIns="50800" rIns="50800" bIns="50800" anchor="ctr"/>
+          <a:lstStyle/>
+          <a:p>
+            <a:pPr>
+              <a:defRPr sz="2200" b="0">
+                <a:solidFill>
+                  <a:srgbClr val="FFFFFF"/>
+                </a:solidFill>
+                <a:latin typeface="+mn-lt"/>
+                <a:ea typeface="+mn-ea"/>
+                <a:cs typeface="+mn-cs"/>
+                <a:sym typeface="Gill Sans SemiBold"/>
+              </a:defRPr>
+            </a:pPr>
+            <a:endParaRPr/>
+          </a:p>
+        </p:txBody>
+      </p:sp>
+      <p:sp>
+        <p:nvSpPr>
+          <p:cNvPr id="335" name="Welcome…"/>
+          <p:cNvSpPr txBox="1"/>
+          <p:nvPr/>
+        </p:nvSpPr>
+        <p:spPr>
+          <a:xfrm>
+            <a:off x="3987800" y="5834278"/>
+            <a:ext cx="5137830" cy="2463801"/>
+          </a:xfrm>
+          <a:prstGeom prst="rect">
+            <a:avLst/>
+          </a:prstGeom>
+          <a:ln w="12700">
+            <a:miter lim="400000"/>
+          </a:ln>
+          <a:extLst>
+            <a:ext uri="{C572A759-6A51-4108-AA02-DFA0A04FC94B}">
+              <ma14:wrappingTextBoxFlag xmlns="" xmlns:m="http://schemas.openxmlformats.org/officeDocument/2006/math" xmlns:a14="http://schemas.microsoft.com/office/drawing/2010/main" xmlns:ma14="http://schemas.microsoft.com/office/mac/drawingml/2011/main" val="1"/>
+            </a:ext>
+          </a:extLst>
+        </p:spPr>
+        <p:txBody>
+          <a:bodyPr lIns="50800" tIns="50800" rIns="50800" bIns="50800">
+            <a:spAutoFit/>
+          </a:bodyPr>
+          <a:lstStyle/>
+          <a:p>
+            <a:pPr algn="l">
+              <a:defRPr sz="5000"/>
+            </a:pPr>
+            <a:r>
+              <a:t>Welcome</a:t>
+            </a:r>
+          </a:p>
+          <a:p>
+            <a:pPr algn="l">
+              <a:defRPr sz="2800" b="0"/>
+            </a:pPr>
+            <a:endParaRPr/>
+          </a:p>
+          <a:p>
+            <a:pPr algn="l">
+              <a:defRPr sz="2800" b="0"/>
+            </a:pPr>
+            <a:r>
+              <a:t>This is a test page.</a:t>
+            </a:r>
+          </a:p>
+          <a:p>
+            <a:pPr algn="l">
+              <a:defRPr sz="2800" b="0"/>
+            </a:pPr>
+            <a:endParaRPr/>
+          </a:p>
+          <a:p>
+            <a:pPr algn="l">
+              <a:defRPr sz="2800" b="0"/>
+            </a:pPr>
+            <a:r>
+              <a:t>It is awesome.</a:t>
+            </a:r>
+          </a:p>
+        </p:txBody>
+      </p:sp>
+      <p:sp>
+        <p:nvSpPr>
+          <p:cNvPr id="336" name="&lt;h1&gt;Welcome&lt;/h1&gt;…"/>
+          <p:cNvSpPr/>
+          <p:nvPr/>
+        </p:nvSpPr>
+        <p:spPr>
+          <a:xfrm>
+            <a:off x="6362700" y="2008443"/>
+            <a:ext cx="5736680" cy="2272870"/>
+          </a:xfrm>
+          <a:prstGeom prst="rect">
+            <a:avLst/>
+          </a:prstGeom>
+          <a:solidFill>
+            <a:srgbClr val="FFFFFF"/>
+          </a:solidFill>
+          <a:ln w="25400">
+            <a:solidFill>
+              <a:srgbClr val="000000"/>
+            </a:solidFill>
+            <a:miter lim="400000"/>
+          </a:ln>
+          <a:extLst>
+            <a:ext uri="{C572A759-6A51-4108-AA02-DFA0A04FC94B}">
+              <ma14:wrappingTextBoxFlag xmlns="" xmlns:m="http://schemas.openxmlformats.org/officeDocument/2006/math" xmlns:a14="http://schemas.microsoft.com/office/drawing/2010/main" xmlns:ma14="http://schemas.microsoft.com/office/mac/drawingml/2011/main" val="1"/>
+            </a:ext>
+          </a:extLst>
+        </p:spPr>
+        <p:txBody>
+          <a:bodyPr lIns="50800" tIns="50800" rIns="50800" bIns="50800"/>
+          <a:lstStyle/>
+          <a:p>
+            <a:pPr algn="l">
+              <a:defRPr sz="2600"/>
+            </a:pPr>
+            <a:r>
+              <a:rPr>
+                <a:solidFill>
+                  <a:schemeClr val="accent5">
+                    <a:hueOff val="-82419"/>
+                    <a:satOff val="-9513"/>
+                    <a:lumOff val="-16343"/>
+                  </a:schemeClr>
+                </a:solidFill>
+              </a:rPr>
+              <a:t>&lt;h1&gt;</a:t>
+            </a:r>
+            <a:r>
+              <a:t>Welcome</a:t>
+            </a:r>
+            <a:r>
+              <a:rPr>
+                <a:solidFill>
+                  <a:schemeClr val="accent5">
+                    <a:hueOff val="-82419"/>
+                    <a:satOff val="-9513"/>
+                    <a:lumOff val="-16343"/>
+                  </a:schemeClr>
+                </a:solidFill>
+              </a:rPr>
+              <a:t>&lt;/h1&gt;</a:t>
+            </a:r>
+          </a:p>
+          <a:p>
+            <a:pPr algn="l">
+              <a:defRPr sz="2600"/>
+            </a:pPr>
+            <a:endParaRPr>
+              <a:solidFill>
+                <a:schemeClr val="accent5">
+                  <a:hueOff val="-82419"/>
+                  <a:satOff val="-9513"/>
+                  <a:lumOff val="-16343"/>
+                </a:schemeClr>
+              </a:solidFill>
+            </a:endParaRPr>
+          </a:p>
+          <a:p>
+            <a:pPr algn="l">
+              <a:defRPr sz="2600"/>
+            </a:pPr>
+            <a:r>
+              <a:t>&lt;p&gt;This is a test page.&lt;/p&gt;</a:t>
+            </a:r>
+          </a:p>
+          <a:p>
+            <a:pPr algn="l">
+              <a:defRPr sz="2600"/>
+            </a:pPr>
+            <a:endParaRPr/>
+          </a:p>
+          <a:p>
+            <a:pPr algn="l">
+              <a:defRPr sz="2600"/>
+            </a:pPr>
+            <a:r>
+              <a:t>&lt;p&gt;It is awesome.&lt;/p&gt;</a:t>
+            </a:r>
+          </a:p>
+        </p:txBody>
+      </p:sp>
+      <p:sp>
+        <p:nvSpPr>
+          <p:cNvPr id="337" name="test.html"/>
+          <p:cNvSpPr txBox="1"/>
+          <p:nvPr/>
+        </p:nvSpPr>
+        <p:spPr>
+          <a:xfrm>
+            <a:off x="6391527" y="1487743"/>
+            <a:ext cx="1547218" cy="457201"/>
+          </a:xfrm>
+          <a:prstGeom prst="rect">
+            <a:avLst/>
+          </a:prstGeom>
+          <a:ln w="12700">
+            <a:miter lim="400000"/>
+          </a:ln>
+          <a:extLst>
+            <a:ext uri="{C572A759-6A51-4108-AA02-DFA0A04FC94B}">
+              <ma14:wrappingTextBoxFlag xmlns="" xmlns:m="http://schemas.openxmlformats.org/officeDocument/2006/math" xmlns:a14="http://schemas.microsoft.com/office/drawing/2010/main" xmlns:ma14="http://schemas.microsoft.com/office/mac/drawingml/2011/main" val="1"/>
+            </a:ext>
+          </a:extLst>
+        </p:spPr>
+        <p:txBody>
+          <a:bodyPr wrap="none" lIns="50800" tIns="50800" rIns="50800" bIns="50800" anchor="ctr">
+            <a:spAutoFit/>
+          </a:bodyPr>
+          <a:lstStyle>
+            <a:lvl1pPr algn="l"/>
+          </a:lstStyle>
+          <a:p>
+            <a:r>
+              <a:t>test.html</a:t>
+            </a:r>
+          </a:p>
+        </p:txBody>
+      </p:sp>
+      <p:sp>
+        <p:nvSpPr>
+          <p:cNvPr id="338" name="h1: big header"/>
+          <p:cNvSpPr txBox="1"/>
+          <p:nvPr/>
+        </p:nvSpPr>
+        <p:spPr>
+          <a:xfrm>
+            <a:off x="1019472" y="2349499"/>
+            <a:ext cx="2964856" cy="685801"/>
+          </a:xfrm>
+          <a:prstGeom prst="rect">
+            <a:avLst/>
+          </a:prstGeom>
+          <a:ln w="12700">
+            <a:miter lim="400000"/>
+          </a:ln>
+          <a:extLst>
+            <a:ext uri="{C572A759-6A51-4108-AA02-DFA0A04FC94B}">
+              <ma14:wrappingTextBoxFlag xmlns="" xmlns:m="http://schemas.openxmlformats.org/officeDocument/2006/math" xmlns:a14="http://schemas.microsoft.com/office/drawing/2010/main" xmlns:ma14="http://schemas.microsoft.com/office/mac/drawingml/2011/main" val="1"/>
+            </a:ext>
+          </a:extLst>
+        </p:spPr>
+        <p:txBody>
+          <a:bodyPr wrap="none" lIns="50800" tIns="50800" rIns="50800" bIns="50800" anchor="ctr">
+            <a:spAutoFit/>
+          </a:bodyPr>
+          <a:lstStyle>
+            <a:lvl1pPr>
+              <a:defRPr sz="4000" b="0"/>
+            </a:lvl1pPr>
+          </a:lstStyle>
+          <a:p>
+            <a:r>
+              <a:t>h1: big header</a:t>
             </a:r>
           </a:p>
         </p:txBody>

</xml_diff>